<commit_message>
docs: fix 6 factual errors in README, update footer and presentation
- Fix output example: 6 files/59 violations → 13 files/70 violations
- Fix security test count: 34 → 46 tests
- Fix bad_project count in summary table: 6 files/~45 → 13 files/58
- Standardize all example paths to examples/ (not gtaa_validator/examples/)
- Fix gtaa-validator command → python -m gtaa_validator in AI config section
- Add java_project, js_project, csharp_project to examples/ structure tree
- Update footer: remove pending items (slides delivered)
- Update presentation slide with corrected data
</commit_message>
<xml_diff>
--- a/gTAA_AI_Validator_TFM_Jose_Antonio_Membrive_Guillen.pptx
+++ b/gTAA_AI_Validator_TFM_Jose_Antonio_Membrive_Guillen.pptx
@@ -2391,7 +2391,7 @@
                 <a:ea typeface="Calibri" panose="020F0502020204030204" pitchFamily="34" charset="-122"/>
                 <a:cs typeface="Calibri" panose="020F0502020204030204" pitchFamily="34" charset="-120"/>
               </a:rPr>
-              <a:t>1</a:t>
+              <a:t>17</a:t>
             </a:r>
             <a:r>
               <a:rPr lang="en-US" sz="1200" dirty="0">
@@ -2402,7 +2402,7 @@
                 <a:ea typeface="Calibri" panose="020F0502020204030204" pitchFamily="34" charset="-122"/>
                 <a:cs typeface="Calibri" panose="020F0502020204030204" pitchFamily="34" charset="-120"/>
               </a:rPr>
-              <a:t>5 commits  |  60 ADRs documentados</a:t>
+              <a:t> commits  |  60 ADRs documentados</a:t>
             </a:r>
             <a:endParaRPr lang="en-US" sz="1200" dirty="0"/>
           </a:p>

</xml_diff>